<commit_message>
added embedded fonts to poster
</commit_message>
<xml_diff>
--- a/doc/Poster.pptx
+++ b/doc/Poster.pptx
@@ -1,6 +1,6 @@
 
 <file path=ppt/presentation.xml><?xml version="1.0" encoding="utf-8"?>
-<p:presentation xmlns:a="http://schemas.openxmlformats.org/drawingml/2006/main" xmlns:r="http://schemas.openxmlformats.org/officeDocument/2006/relationships" xmlns:p="http://schemas.openxmlformats.org/presentationml/2006/main" saveSubsetFonts="1">
+<p:presentation xmlns:a="http://schemas.openxmlformats.org/drawingml/2006/main" xmlns:r="http://schemas.openxmlformats.org/officeDocument/2006/relationships" xmlns:p="http://schemas.openxmlformats.org/presentationml/2006/main" embedTrueTypeFonts="1">
   <p:sldMasterIdLst>
     <p:sldMasterId id="2147483648" r:id="rId1"/>
   </p:sldMasterIdLst>
@@ -9,6 +9,19 @@
   </p:sldIdLst>
   <p:sldSz cx="32918400" cy="21945600"/>
   <p:notesSz cx="6858000" cy="9144000"/>
+  <p:embeddedFontLst>
+    <p:embeddedFont>
+      <p:font typeface="Lucida Calligraphy" panose="03010101010101010101" pitchFamily="66" charset="0"/>
+      <p:regular r:id="rId3"/>
+    </p:embeddedFont>
+    <p:embeddedFont>
+      <p:font typeface="Segoe UI" panose="020B0502040204020203" pitchFamily="34" charset="0"/>
+      <p:regular r:id="rId4"/>
+      <p:bold r:id="rId5"/>
+      <p:italic r:id="rId6"/>
+      <p:boldItalic r:id="rId7"/>
+    </p:embeddedFont>
+  </p:embeddedFontLst>
   <p:defaultTextStyle>
     <a:defPPr>
       <a:defRPr lang="en-US"/>
@@ -136,7 +149,7 @@
   </p:defaultTextStyle>
   <p:extLst>
     <p:ext uri="{EFAFB233-063F-42B5-8137-9DF3F51BA10A}">
-      <p15:sldGuideLst xmlns:p15="http://schemas.microsoft.com/office/powerpoint/2012/main">
+      <p15:sldGuideLst xmlns:p15="http://schemas.microsoft.com/office/powerpoint/2012/main" xmlns="">
         <p15:guide id="1" orient="horz" pos="6912">
           <p15:clr>
             <a:srgbClr val="A4A3A4"/>
@@ -3509,15 +3522,7 @@
                 <a:ea typeface="Segoe UI" panose="020B0502040204020203" pitchFamily="34" charset="0"/>
                 <a:cs typeface="Segoe UI" panose="020B0502040204020203" pitchFamily="34" charset="0"/>
               </a:rPr>
-              <a:t>Fall </a:t>
-            </a:r>
-            <a:r>
-              <a:rPr lang="en-US" sz="4600" dirty="0" smtClean="0">
-                <a:latin typeface="Segoe UI" panose="020B0502040204020203" pitchFamily="34" charset="0"/>
-                <a:ea typeface="Segoe UI" panose="020B0502040204020203" pitchFamily="34" charset="0"/>
-                <a:cs typeface="Segoe UI" panose="020B0502040204020203" pitchFamily="34" charset="0"/>
-              </a:rPr>
-              <a:t>2013</a:t>
+              <a:t>Fall 2013</a:t>
             </a:r>
             <a:endParaRPr lang="en-US" sz="4600" dirty="0">
               <a:latin typeface="Segoe UI" panose="020B0502040204020203" pitchFamily="34" charset="0"/>
@@ -4116,6 +4121,13 @@
   <p:clrMapOvr>
     <a:masterClrMapping/>
   </p:clrMapOvr>
+  <p:timing>
+    <p:tnLst>
+      <p:par>
+        <p:cTn id="1" dur="indefinite" restart="never" nodeType="tmRoot"/>
+      </p:par>
+    </p:tnLst>
+  </p:timing>
 </p:sld>
 </file>
 

</xml_diff>

<commit_message>
added more pictures to poster and weeded out some text.
</commit_message>
<xml_diff>
--- a/doc/Poster.pptx
+++ b/doc/Poster.pptx
@@ -11,15 +11,15 @@
   <p:notesSz cx="6858000" cy="9144000"/>
   <p:embeddedFontLst>
     <p:embeddedFont>
-      <p:font typeface="Lucida Calligraphy" panose="03010101010101010101" pitchFamily="66" charset="0"/>
+      <p:font typeface="Segoe UI" panose="020B0502040204020203" pitchFamily="34" charset="0"/>
       <p:regular r:id="rId3"/>
+      <p:bold r:id="rId4"/>
+      <p:italic r:id="rId5"/>
+      <p:boldItalic r:id="rId6"/>
     </p:embeddedFont>
     <p:embeddedFont>
-      <p:font typeface="Segoe UI" panose="020B0502040204020203" pitchFamily="34" charset="0"/>
-      <p:regular r:id="rId4"/>
-      <p:bold r:id="rId5"/>
-      <p:italic r:id="rId6"/>
-      <p:boldItalic r:id="rId7"/>
+      <p:font typeface="Lucida Calligraphy" panose="03010101010101010101" pitchFamily="66" charset="0"/>
+      <p:regular r:id="rId7"/>
     </p:embeddedFont>
   </p:embeddedFontLst>
   <p:defaultTextStyle>
@@ -149,7 +149,7 @@
   </p:defaultTextStyle>
   <p:extLst>
     <p:ext uri="{EFAFB233-063F-42B5-8137-9DF3F51BA10A}">
-      <p15:sldGuideLst xmlns:p15="http://schemas.microsoft.com/office/powerpoint/2012/main" xmlns="">
+      <p15:sldGuideLst xmlns:p15="http://schemas.microsoft.com/office/powerpoint/2012/main">
         <p15:guide id="1" orient="horz" pos="6912">
           <p15:clr>
             <a:srgbClr val="A4A3A4"/>
@@ -3670,7 +3670,7 @@
         </p:blipFill>
         <p:spPr>
           <a:xfrm>
-            <a:off x="11658600" y="3448950"/>
+            <a:off x="11556404" y="2705271"/>
             <a:ext cx="8519161" cy="5723811"/>
           </a:xfrm>
           <a:prstGeom prst="rect">
@@ -3686,8 +3686,8 @@
         </p:nvSpPr>
         <p:spPr>
           <a:xfrm>
-            <a:off x="11430000" y="9471544"/>
-            <a:ext cx="12557761" cy="1477328"/>
+            <a:off x="11480998" y="8660063"/>
+            <a:ext cx="9009206" cy="1477328"/>
           </a:xfrm>
           <a:prstGeom prst="rect">
             <a:avLst/>
@@ -3750,8 +3750,8 @@
         </p:blipFill>
         <p:spPr>
           <a:xfrm>
-            <a:off x="20726401" y="12697155"/>
-            <a:ext cx="11172824" cy="7227378"/>
+            <a:off x="22250400" y="8742315"/>
+            <a:ext cx="8131179" cy="5259826"/>
           </a:xfrm>
           <a:prstGeom prst="rect">
             <a:avLst/>
@@ -3780,7 +3780,7 @@
         </p:blipFill>
         <p:spPr>
           <a:xfrm>
-            <a:off x="838200" y="15886919"/>
+            <a:off x="1319213" y="14267260"/>
             <a:ext cx="6986587" cy="5239940"/>
           </a:xfrm>
           <a:prstGeom prst="rect">
@@ -3796,8 +3796,8 @@
         </p:nvSpPr>
         <p:spPr>
           <a:xfrm>
-            <a:off x="8622051" y="11923691"/>
-            <a:ext cx="12070081" cy="6863417"/>
+            <a:off x="8743450" y="10411736"/>
+            <a:ext cx="12070081" cy="4924425"/>
           </a:xfrm>
           <a:prstGeom prst="rect">
             <a:avLst/>
@@ -3817,8 +3817,13 @@
                 <a:ea typeface="Segoe UI" panose="020B0502040204020203" pitchFamily="34" charset="0"/>
                 <a:cs typeface="Segoe UI" panose="020B0502040204020203" pitchFamily="34" charset="0"/>
               </a:rPr>
-              <a:t>Headset Packaging</a:t>
-            </a:r>
+              <a:t>Packaging</a:t>
+            </a:r>
+            <a:endParaRPr lang="en-US" sz="4400" dirty="0" smtClean="0">
+              <a:latin typeface="Segoe UI" panose="020B0502040204020203" pitchFamily="34" charset="0"/>
+              <a:ea typeface="Segoe UI" panose="020B0502040204020203" pitchFamily="34" charset="0"/>
+              <a:cs typeface="Segoe UI" panose="020B0502040204020203" pitchFamily="34" charset="0"/>
+            </a:endParaRPr>
           </a:p>
           <a:p>
             <a:pPr marL="571500" indent="-571500" algn="l">
@@ -3826,7 +3831,7 @@
               <a:buChar char="•"/>
             </a:pPr>
             <a:r>
-              <a:rPr lang="en-US" sz="4000" b="0" dirty="0" smtClean="0">
+              <a:rPr lang="en-US" sz="3600" dirty="0" smtClean="0">
                 <a:latin typeface="Segoe UI" panose="020B0502040204020203" pitchFamily="34" charset="0"/>
                 <a:ea typeface="Segoe UI" panose="020B0502040204020203" pitchFamily="34" charset="0"/>
                 <a:cs typeface="Segoe UI" panose="020B0502040204020203" pitchFamily="34" charset="0"/>
@@ -3840,7 +3845,7 @@
               <a:buChar char="•"/>
             </a:pPr>
             <a:r>
-              <a:rPr lang="en-US" sz="4000" b="0" dirty="0" smtClean="0">
+              <a:rPr lang="en-US" sz="3600" dirty="0" smtClean="0">
                 <a:latin typeface="Segoe UI" panose="020B0502040204020203" pitchFamily="34" charset="0"/>
                 <a:ea typeface="Segoe UI" panose="020B0502040204020203" pitchFamily="34" charset="0"/>
                 <a:cs typeface="Segoe UI" panose="020B0502040204020203" pitchFamily="34" charset="0"/>
@@ -3854,26 +3859,20 @@
               <a:buChar char="•"/>
             </a:pPr>
             <a:r>
-              <a:rPr lang="en-US" sz="4000" b="0" dirty="0" smtClean="0">
+              <a:rPr lang="en-US" sz="3600" dirty="0" smtClean="0">
                 <a:latin typeface="Segoe UI" panose="020B0502040204020203" pitchFamily="34" charset="0"/>
                 <a:ea typeface="Segoe UI" panose="020B0502040204020203" pitchFamily="34" charset="0"/>
                 <a:cs typeface="Segoe UI" panose="020B0502040204020203" pitchFamily="34" charset="0"/>
               </a:rPr>
-              <a:t>Weight is well balanced because of the front mounted display and rear mounted battery</a:t>
-            </a:r>
-          </a:p>
-          <a:p>
-            <a:pPr marL="571500" indent="-571500" algn="l">
-              <a:buFont typeface="Arial" panose="020B0604020202020204" pitchFamily="34" charset="0"/>
-              <a:buChar char="•"/>
-            </a:pPr>
-            <a:r>
-              <a:rPr lang="en-US" sz="4000" b="0" dirty="0" smtClean="0">
+              <a:t>Aluminum </a:t>
+            </a:r>
+            <a:r>
+              <a:rPr lang="en-US" sz="3600" dirty="0" smtClean="0">
                 <a:latin typeface="Segoe UI" panose="020B0502040204020203" pitchFamily="34" charset="0"/>
                 <a:ea typeface="Segoe UI" panose="020B0502040204020203" pitchFamily="34" charset="0"/>
                 <a:cs typeface="Segoe UI" panose="020B0502040204020203" pitchFamily="34" charset="0"/>
               </a:rPr>
-              <a:t>Aluminum and plastic construction allows for a lightweight yet rigid frame</a:t>
+              <a:t>and plastic construction allows for a lightweight yet rigid frame</a:t>
             </a:r>
           </a:p>
         </p:txBody>
@@ -3886,8 +3885,8 @@
         </p:nvSpPr>
         <p:spPr>
           <a:xfrm>
-            <a:off x="21107399" y="3448950"/>
-            <a:ext cx="10791825" cy="7540526"/>
+            <a:off x="21107400" y="2689466"/>
+            <a:ext cx="10791825" cy="6309420"/>
           </a:xfrm>
           <a:prstGeom prst="rect">
             <a:avLst/>
@@ -3916,7 +3915,7 @@
               <a:buChar char="•"/>
             </a:pPr>
             <a:r>
-              <a:rPr lang="en-US" sz="4000" b="0" dirty="0" smtClean="0">
+              <a:rPr lang="en-US" sz="3600" dirty="0" smtClean="0">
                 <a:latin typeface="Segoe UI" panose="020B0502040204020203" pitchFamily="34" charset="0"/>
                 <a:ea typeface="Segoe UI" panose="020B0502040204020203" pitchFamily="34" charset="0"/>
                 <a:cs typeface="Segoe UI" panose="020B0502040204020203" pitchFamily="34" charset="0"/>
@@ -3930,7 +3929,7 @@
               <a:buChar char="•"/>
             </a:pPr>
             <a:r>
-              <a:rPr lang="en-US" sz="4000" b="0" dirty="0" smtClean="0">
+              <a:rPr lang="en-US" sz="3600" dirty="0" smtClean="0">
                 <a:latin typeface="Segoe UI" panose="020B0502040204020203" pitchFamily="34" charset="0"/>
                 <a:ea typeface="Segoe UI" panose="020B0502040204020203" pitchFamily="34" charset="0"/>
                 <a:cs typeface="Segoe UI" panose="020B0502040204020203" pitchFamily="34" charset="0"/>
@@ -3944,13 +3943,26 @@
               <a:buChar char="•"/>
             </a:pPr>
             <a:r>
-              <a:rPr lang="en-US" sz="4000" b="0" dirty="0" smtClean="0">
+              <a:rPr lang="en-US" sz="3600" dirty="0" smtClean="0">
                 <a:latin typeface="Segoe UI" panose="020B0502040204020203" pitchFamily="34" charset="0"/>
                 <a:ea typeface="Segoe UI" panose="020B0502040204020203" pitchFamily="34" charset="0"/>
                 <a:cs typeface="Segoe UI" panose="020B0502040204020203" pitchFamily="34" charset="0"/>
               </a:rPr>
-              <a:t>Uses STM32F4 microcontroller with FPU for unmatched sensor processing power</a:t>
-            </a:r>
+              <a:t>Uses STM32F4 microcontroller with </a:t>
+            </a:r>
+            <a:r>
+              <a:rPr lang="en-US" sz="3600" dirty="0" smtClean="0">
+                <a:latin typeface="Segoe UI" panose="020B0502040204020203" pitchFamily="34" charset="0"/>
+                <a:ea typeface="Segoe UI" panose="020B0502040204020203" pitchFamily="34" charset="0"/>
+                <a:cs typeface="Segoe UI" panose="020B0502040204020203" pitchFamily="34" charset="0"/>
+              </a:rPr>
+              <a:t>FPU.</a:t>
+            </a:r>
+            <a:endParaRPr lang="en-US" sz="3600" dirty="0" smtClean="0">
+              <a:latin typeface="Segoe UI" panose="020B0502040204020203" pitchFamily="34" charset="0"/>
+              <a:ea typeface="Segoe UI" panose="020B0502040204020203" pitchFamily="34" charset="0"/>
+              <a:cs typeface="Segoe UI" panose="020B0502040204020203" pitchFamily="34" charset="0"/>
+            </a:endParaRPr>
           </a:p>
           <a:p>
             <a:pPr marL="571500" indent="-571500" algn="l">
@@ -3958,13 +3970,34 @@
               <a:buChar char="•"/>
             </a:pPr>
             <a:r>
-              <a:rPr lang="en-US" sz="4000" b="0" dirty="0" smtClean="0">
+              <a:rPr lang="en-US" sz="3600" dirty="0" smtClean="0">
                 <a:latin typeface="Segoe UI" panose="020B0502040204020203" pitchFamily="34" charset="0"/>
                 <a:ea typeface="Segoe UI" panose="020B0502040204020203" pitchFamily="34" charset="0"/>
                 <a:cs typeface="Segoe UI" panose="020B0502040204020203" pitchFamily="34" charset="0"/>
               </a:rPr>
-              <a:t>USB programming, battery sensing and charging, GPS, wireless radio, and 9-degree of freedom inertial measurement unit</a:t>
-            </a:r>
+              <a:t>Battery sensing </a:t>
+            </a:r>
+            <a:r>
+              <a:rPr lang="en-US" sz="3600" dirty="0" smtClean="0">
+                <a:latin typeface="Segoe UI" panose="020B0502040204020203" pitchFamily="34" charset="0"/>
+                <a:ea typeface="Segoe UI" panose="020B0502040204020203" pitchFamily="34" charset="0"/>
+                <a:cs typeface="Segoe UI" panose="020B0502040204020203" pitchFamily="34" charset="0"/>
+              </a:rPr>
+              <a:t>and charging, GPS, wireless radio, and 9-degree of freedom inertial </a:t>
+            </a:r>
+            <a:r>
+              <a:rPr lang="en-US" sz="3600" dirty="0" smtClean="0">
+                <a:latin typeface="Segoe UI" panose="020B0502040204020203" pitchFamily="34" charset="0"/>
+                <a:ea typeface="Segoe UI" panose="020B0502040204020203" pitchFamily="34" charset="0"/>
+                <a:cs typeface="Segoe UI" panose="020B0502040204020203" pitchFamily="34" charset="0"/>
+              </a:rPr>
+              <a:t>measurement</a:t>
+            </a:r>
+            <a:endParaRPr lang="en-US" sz="3600" dirty="0" smtClean="0">
+              <a:latin typeface="Segoe UI" panose="020B0502040204020203" pitchFamily="34" charset="0"/>
+              <a:ea typeface="Segoe UI" panose="020B0502040204020203" pitchFamily="34" charset="0"/>
+              <a:cs typeface="Segoe UI" panose="020B0502040204020203" pitchFamily="34" charset="0"/>
+            </a:endParaRPr>
           </a:p>
         </p:txBody>
       </p:sp>
@@ -4014,8 +4047,8 @@
         </p:nvSpPr>
         <p:spPr>
           <a:xfrm>
-            <a:off x="609600" y="3448950"/>
-            <a:ext cx="10820400" cy="8463855"/>
+            <a:off x="1082753" y="2705271"/>
+            <a:ext cx="9593553" cy="8340745"/>
           </a:xfrm>
           <a:prstGeom prst="rect">
             <a:avLst/>
@@ -4040,15 +4073,15 @@
               <a:buChar char="•"/>
             </a:pPr>
             <a:r>
-              <a:rPr lang="en-US" sz="4000" b="0" dirty="0" smtClean="0"/>
+              <a:rPr lang="en-US" sz="3600" dirty="0" smtClean="0"/>
               <a:t>Players don the headset to experience an immersive multiplayer augmented reality </a:t>
             </a:r>
             <a:r>
-              <a:rPr lang="en-US" sz="4000" b="0" dirty="0" err="1" smtClean="0"/>
+              <a:rPr lang="en-US" sz="3600" dirty="0" err="1" smtClean="0"/>
               <a:t>Pacman</a:t>
             </a:r>
             <a:r>
-              <a:rPr lang="en-US" sz="4000" b="0" dirty="0" smtClean="0"/>
+              <a:rPr lang="en-US" sz="3600" dirty="0" smtClean="0"/>
               <a:t>-like game</a:t>
             </a:r>
           </a:p>
@@ -4058,8 +4091,16 @@
               <a:buChar char="•"/>
             </a:pPr>
             <a:r>
-              <a:rPr lang="en-US" sz="4000" b="0" dirty="0" smtClean="0"/>
-              <a:t>The semi-transparent display seamlessly integrates game objects with the real world</a:t>
+              <a:rPr lang="en-US" sz="3600" dirty="0" smtClean="0"/>
+              <a:t>The semi-transparent </a:t>
+            </a:r>
+            <a:r>
+              <a:rPr lang="en-US" sz="3600" dirty="0" smtClean="0"/>
+              <a:t>display </a:t>
+            </a:r>
+            <a:r>
+              <a:rPr lang="en-US" sz="3600" dirty="0" smtClean="0"/>
+              <a:t>integrates game objects with the real world</a:t>
             </a:r>
           </a:p>
           <a:p>
@@ -4068,10 +4109,10 @@
               <a:buChar char="•"/>
             </a:pPr>
             <a:r>
-              <a:rPr lang="en-US" sz="4000" b="0" dirty="0" smtClean="0"/>
+              <a:rPr lang="en-US" sz="3600" dirty="0" smtClean="0"/>
               <a:t>Wireless multiplayer is facilitated by a central control unit</a:t>
             </a:r>
-            <a:endParaRPr lang="en-US" sz="4000" b="0" dirty="0"/>
+            <a:endParaRPr lang="en-US" sz="3600" dirty="0"/>
           </a:p>
           <a:p>
             <a:pPr marL="571500" indent="-571500" algn="l">
@@ -4079,7 +4120,7 @@
               <a:buChar char="•"/>
             </a:pPr>
             <a:r>
-              <a:rPr lang="en-US" sz="4000" b="0" dirty="0" smtClean="0"/>
+              <a:rPr lang="en-US" sz="3600" dirty="0" smtClean="0"/>
               <a:t>Gameplay is based on geospatial data from GPS and head orientation from an IMU</a:t>
             </a:r>
           </a:p>
@@ -4108,8 +4149,128 @@
         </p:blipFill>
         <p:spPr>
           <a:xfrm>
-            <a:off x="838200" y="11465942"/>
+            <a:off x="1295400" y="9958189"/>
             <a:ext cx="7020856" cy="4367411"/>
+          </a:xfrm>
+          <a:prstGeom prst="rect">
+            <a:avLst/>
+          </a:prstGeom>
+        </p:spPr>
+      </p:pic>
+      <p:pic>
+        <p:nvPicPr>
+          <p:cNvPr id="7" name="Picture 6"/>
+          <p:cNvPicPr>
+            <a:picLocks noChangeAspect="1"/>
+          </p:cNvPicPr>
+          <p:nvPr/>
+        </p:nvPicPr>
+        <p:blipFill>
+          <a:blip r:embed="rId7" cstate="print">
+            <a:extLst>
+              <a:ext uri="{28A0092B-C50C-407E-A947-70E740481C1C}">
+                <a14:useLocalDpi xmlns:a14="http://schemas.microsoft.com/office/drawing/2010/main" val="0"/>
+              </a:ext>
+            </a:extLst>
+          </a:blip>
+          <a:stretch>
+            <a:fillRect/>
+          </a:stretch>
+        </p:blipFill>
+        <p:spPr>
+          <a:xfrm>
+            <a:off x="22634172" y="13955483"/>
+            <a:ext cx="7708336" cy="5781251"/>
+          </a:xfrm>
+          <a:prstGeom prst="rect">
+            <a:avLst/>
+          </a:prstGeom>
+        </p:spPr>
+      </p:pic>
+      <p:pic>
+        <p:nvPicPr>
+          <p:cNvPr id="9" name="Picture 8"/>
+          <p:cNvPicPr>
+            <a:picLocks noChangeAspect="1"/>
+          </p:cNvPicPr>
+          <p:nvPr/>
+        </p:nvPicPr>
+        <p:blipFill>
+          <a:blip r:embed="rId8" cstate="print">
+            <a:extLst>
+              <a:ext uri="{28A0092B-C50C-407E-A947-70E740481C1C}">
+                <a14:useLocalDpi xmlns:a14="http://schemas.microsoft.com/office/drawing/2010/main" val="0"/>
+              </a:ext>
+            </a:extLst>
+          </a:blip>
+          <a:stretch>
+            <a:fillRect/>
+          </a:stretch>
+        </p:blipFill>
+        <p:spPr>
+          <a:xfrm>
+            <a:off x="13099980" y="15996468"/>
+            <a:ext cx="4764394" cy="3573296"/>
+          </a:xfrm>
+          <a:prstGeom prst="rect">
+            <a:avLst/>
+          </a:prstGeom>
+        </p:spPr>
+      </p:pic>
+      <p:pic>
+        <p:nvPicPr>
+          <p:cNvPr id="13" name="Picture 12"/>
+          <p:cNvPicPr>
+            <a:picLocks noChangeAspect="1"/>
+          </p:cNvPicPr>
+          <p:nvPr/>
+        </p:nvPicPr>
+        <p:blipFill>
+          <a:blip r:embed="rId9" cstate="print">
+            <a:extLst>
+              <a:ext uri="{28A0092B-C50C-407E-A947-70E740481C1C}">
+                <a14:useLocalDpi xmlns:a14="http://schemas.microsoft.com/office/drawing/2010/main" val="0"/>
+              </a:ext>
+            </a:extLst>
+          </a:blip>
+          <a:stretch>
+            <a:fillRect/>
+          </a:stretch>
+        </p:blipFill>
+        <p:spPr>
+          <a:xfrm>
+            <a:off x="8314239" y="15988364"/>
+            <a:ext cx="4800600" cy="3581400"/>
+          </a:xfrm>
+          <a:prstGeom prst="rect">
+            <a:avLst/>
+          </a:prstGeom>
+        </p:spPr>
+      </p:pic>
+      <p:pic>
+        <p:nvPicPr>
+          <p:cNvPr id="14" name="Picture 13"/>
+          <p:cNvPicPr>
+            <a:picLocks noChangeAspect="1"/>
+          </p:cNvPicPr>
+          <p:nvPr/>
+        </p:nvPicPr>
+        <p:blipFill>
+          <a:blip r:embed="rId10" cstate="print">
+            <a:extLst>
+              <a:ext uri="{28A0092B-C50C-407E-A947-70E740481C1C}">
+                <a14:useLocalDpi xmlns:a14="http://schemas.microsoft.com/office/drawing/2010/main" val="0"/>
+              </a:ext>
+            </a:extLst>
+          </a:blip>
+          <a:stretch>
+            <a:fillRect/>
+          </a:stretch>
+        </p:blipFill>
+        <p:spPr>
+          <a:xfrm>
+            <a:off x="17864374" y="15992416"/>
+            <a:ext cx="4769798" cy="3577348"/>
           </a:xfrm>
           <a:prstGeom prst="rect">
             <a:avLst/>

</xml_diff>